<commit_message>
Minor updates before defense
</commit_message>
<xml_diff>
--- a/thesis/presentation/presentation-graphics.pptx
+++ b/thesis/presentation/presentation-graphics.pptx
@@ -6,6 +6,7 @@
   </p:sldMasterIdLst>
   <p:sldIdLst>
     <p:sldId id="257" r:id="rId2"/>
+    <p:sldId id="258" r:id="rId3"/>
   </p:sldIdLst>
   <p:sldSz cx="9144000" cy="6858000" type="screen4x3"/>
   <p:notesSz cx="6858000" cy="9144000"/>
@@ -1067,8 +1068,8 @@
     <dgm:cxn modelId="{74DB2056-17DA-C247-A36F-08C0D351E437}" type="presOf" srcId="{E71AB201-6B0C-F54E-939E-D3E37C6D8EC3}" destId="{E990345E-7974-1E4E-A1DF-B6B27D45CACB}" srcOrd="0" destOrd="0" presId="urn:microsoft.com/office/officeart/2005/8/layout/cycle2"/>
     <dgm:cxn modelId="{1EE53480-ACD0-F14D-A716-0B4A37E2AB41}" type="presOf" srcId="{600B8559-4DBC-C549-A729-520764FE2140}" destId="{6425BCB0-BCC2-5A49-B558-C03F6AE9D475}" srcOrd="1" destOrd="0" presId="urn:microsoft.com/office/officeart/2005/8/layout/cycle2"/>
     <dgm:cxn modelId="{2E3CD1B6-5748-5246-BC38-0FF9188193CE}" type="presOf" srcId="{4F3CC531-02DE-2F4E-ACFA-C45B3541AA9B}" destId="{8B1C12AF-DD46-094F-9E84-4B3943DA271B}" srcOrd="1" destOrd="0" presId="urn:microsoft.com/office/officeart/2005/8/layout/cycle2"/>
+    <dgm:cxn modelId="{9601A0AD-C9FF-8A4E-A1D4-F33EDBB2FFA4}" type="presOf" srcId="{600B8559-4DBC-C549-A729-520764FE2140}" destId="{36E7C532-41A6-EA40-B85E-D3013B033C7F}" srcOrd="0" destOrd="0" presId="urn:microsoft.com/office/officeart/2005/8/layout/cycle2"/>
     <dgm:cxn modelId="{84EF97A4-A4E9-784A-B02F-4E0F6B83E516}" srcId="{E71AB201-6B0C-F54E-939E-D3E37C6D8EC3}" destId="{652C0AB8-15A5-D847-A2EC-636A52E2FDE3}" srcOrd="0" destOrd="0" parTransId="{F56BB4B4-3027-B145-A786-F3461514917F}" sibTransId="{600B8559-4DBC-C549-A729-520764FE2140}"/>
-    <dgm:cxn modelId="{9601A0AD-C9FF-8A4E-A1D4-F33EDBB2FFA4}" type="presOf" srcId="{600B8559-4DBC-C549-A729-520764FE2140}" destId="{36E7C532-41A6-EA40-B85E-D3013B033C7F}" srcOrd="0" destOrd="0" presId="urn:microsoft.com/office/officeart/2005/8/layout/cycle2"/>
     <dgm:cxn modelId="{C904B4C9-CA42-F844-8D96-91C60885FE59}" srcId="{E71AB201-6B0C-F54E-939E-D3E37C6D8EC3}" destId="{01C3A76B-CDD6-1A40-931E-CEE3310C7825}" srcOrd="1" destOrd="0" parTransId="{2BA1C1D0-12D6-FE44-BDC6-EAAA1EA8C19E}" sibTransId="{4F3CC531-02DE-2F4E-ACFA-C45B3541AA9B}"/>
     <dgm:cxn modelId="{E672F2A8-2E6A-9F45-A4F9-058BF6ED0D8C}" type="presOf" srcId="{01C3A76B-CDD6-1A40-931E-CEE3310C7825}" destId="{CBC95709-2DC2-B144-9E2A-D19D81BD9C72}" srcOrd="0" destOrd="0" presId="urn:microsoft.com/office/officeart/2005/8/layout/cycle2"/>
     <dgm:cxn modelId="{FC3B5FB5-DFD3-8E4F-8A01-519874C3E7ED}" type="presParOf" srcId="{E990345E-7974-1E4E-A1DF-B6B27D45CACB}" destId="{FA2E2C40-D9FF-3E45-92E2-873562966B17}" srcOrd="0" destOrd="0" presId="urn:microsoft.com/office/officeart/2005/8/layout/cycle2"/>
@@ -2846,7 +2847,7 @@
           <a:p>
             <a:fld id="{1332704E-597F-B149-B0D6-69617905561A}" type="datetimeFigureOut">
               <a:rPr lang="en-US" smtClean="0"/>
-              <a:t>2/14/17</a:t>
+              <a:t>3/13/17</a:t>
             </a:fld>
             <a:endParaRPr lang="en-US"/>
           </a:p>
@@ -3016,7 +3017,7 @@
           <a:p>
             <a:fld id="{1332704E-597F-B149-B0D6-69617905561A}" type="datetimeFigureOut">
               <a:rPr lang="en-US" smtClean="0"/>
-              <a:t>2/14/17</a:t>
+              <a:t>3/13/17</a:t>
             </a:fld>
             <a:endParaRPr lang="en-US"/>
           </a:p>
@@ -3196,7 +3197,7 @@
           <a:p>
             <a:fld id="{1332704E-597F-B149-B0D6-69617905561A}" type="datetimeFigureOut">
               <a:rPr lang="en-US" smtClean="0"/>
-              <a:t>2/14/17</a:t>
+              <a:t>3/13/17</a:t>
             </a:fld>
             <a:endParaRPr lang="en-US"/>
           </a:p>
@@ -3366,7 +3367,7 @@
           <a:p>
             <a:fld id="{1332704E-597F-B149-B0D6-69617905561A}" type="datetimeFigureOut">
               <a:rPr lang="en-US" smtClean="0"/>
-              <a:t>2/14/17</a:t>
+              <a:t>3/13/17</a:t>
             </a:fld>
             <a:endParaRPr lang="en-US"/>
           </a:p>
@@ -3612,7 +3613,7 @@
           <a:p>
             <a:fld id="{1332704E-597F-B149-B0D6-69617905561A}" type="datetimeFigureOut">
               <a:rPr lang="en-US" smtClean="0"/>
-              <a:t>2/14/17</a:t>
+              <a:t>3/13/17</a:t>
             </a:fld>
             <a:endParaRPr lang="en-US"/>
           </a:p>
@@ -3900,7 +3901,7 @@
           <a:p>
             <a:fld id="{1332704E-597F-B149-B0D6-69617905561A}" type="datetimeFigureOut">
               <a:rPr lang="en-US" smtClean="0"/>
-              <a:t>2/14/17</a:t>
+              <a:t>3/13/17</a:t>
             </a:fld>
             <a:endParaRPr lang="en-US"/>
           </a:p>
@@ -4322,7 +4323,7 @@
           <a:p>
             <a:fld id="{1332704E-597F-B149-B0D6-69617905561A}" type="datetimeFigureOut">
               <a:rPr lang="en-US" smtClean="0"/>
-              <a:t>2/14/17</a:t>
+              <a:t>3/13/17</a:t>
             </a:fld>
             <a:endParaRPr lang="en-US"/>
           </a:p>
@@ -4440,7 +4441,7 @@
           <a:p>
             <a:fld id="{1332704E-597F-B149-B0D6-69617905561A}" type="datetimeFigureOut">
               <a:rPr lang="en-US" smtClean="0"/>
-              <a:t>2/14/17</a:t>
+              <a:t>3/13/17</a:t>
             </a:fld>
             <a:endParaRPr lang="en-US"/>
           </a:p>
@@ -4535,7 +4536,7 @@
           <a:p>
             <a:fld id="{1332704E-597F-B149-B0D6-69617905561A}" type="datetimeFigureOut">
               <a:rPr lang="en-US" smtClean="0"/>
-              <a:t>2/14/17</a:t>
+              <a:t>3/13/17</a:t>
             </a:fld>
             <a:endParaRPr lang="en-US"/>
           </a:p>
@@ -4812,7 +4813,7 @@
           <a:p>
             <a:fld id="{1332704E-597F-B149-B0D6-69617905561A}" type="datetimeFigureOut">
               <a:rPr lang="en-US" smtClean="0"/>
-              <a:t>2/14/17</a:t>
+              <a:t>3/13/17</a:t>
             </a:fld>
             <a:endParaRPr lang="en-US"/>
           </a:p>
@@ -5065,7 +5066,7 @@
           <a:p>
             <a:fld id="{1332704E-597F-B149-B0D6-69617905561A}" type="datetimeFigureOut">
               <a:rPr lang="en-US" smtClean="0"/>
-              <a:t>2/14/17</a:t>
+              <a:t>3/13/17</a:t>
             </a:fld>
             <a:endParaRPr lang="en-US"/>
           </a:p>
@@ -5278,7 +5279,7 @@
           <a:p>
             <a:fld id="{1332704E-597F-B149-B0D6-69617905561A}" type="datetimeFigureOut">
               <a:rPr lang="en-US" smtClean="0"/>
-              <a:t>2/14/17</a:t>
+              <a:t>3/13/17</a:t>
             </a:fld>
             <a:endParaRPr lang="en-US"/>
           </a:p>
@@ -5792,6 +5793,128 @@
       </p:par>
     </p:tnLst>
   </p:timing>
+</p:sld>
+</file>
+
+<file path=ppt/slides/slide2.xml><?xml version="1.0" encoding="utf-8"?>
+<p:sld xmlns:a="http://schemas.openxmlformats.org/drawingml/2006/main" xmlns:r="http://schemas.openxmlformats.org/officeDocument/2006/relationships" xmlns:p="http://schemas.openxmlformats.org/presentationml/2006/main">
+  <p:cSld>
+    <p:spTree>
+      <p:nvGrpSpPr>
+        <p:cNvPr id="1" name=""/>
+        <p:cNvGrpSpPr/>
+        <p:nvPr/>
+      </p:nvGrpSpPr>
+      <p:grpSpPr>
+        <a:xfrm>
+          <a:off x="0" y="0"/>
+          <a:ext cx="0" cy="0"/>
+          <a:chOff x="0" y="0"/>
+          <a:chExt cx="0" cy="0"/>
+        </a:xfrm>
+      </p:grpSpPr>
+      <p:pic>
+        <p:nvPicPr>
+          <p:cNvPr id="2" name="Picture 1"/>
+          <p:cNvPicPr>
+            <a:picLocks noChangeAspect="1"/>
+          </p:cNvPicPr>
+          <p:nvPr/>
+        </p:nvPicPr>
+        <p:blipFill>
+          <a:blip r:embed="rId2">
+            <a:extLst>
+              <a:ext uri="{28A0092B-C50C-407E-A947-70E740481C1C}">
+                <a14:useLocalDpi xmlns:a14="http://schemas.microsoft.com/office/drawing/2010/main" val="0"/>
+              </a:ext>
+            </a:extLst>
+          </a:blip>
+          <a:stretch>
+            <a:fillRect/>
+          </a:stretch>
+        </p:blipFill>
+        <p:spPr>
+          <a:xfrm>
+            <a:off x="823167" y="482507"/>
+            <a:ext cx="7173168" cy="6375493"/>
+          </a:xfrm>
+          <a:prstGeom prst="rect">
+            <a:avLst/>
+          </a:prstGeom>
+        </p:spPr>
+      </p:pic>
+      <p:cxnSp>
+        <p:nvCxnSpPr>
+          <p:cNvPr id="4" name="Straight Arrow Connector 3"/>
+          <p:cNvCxnSpPr/>
+          <p:nvPr/>
+        </p:nvCxnSpPr>
+        <p:spPr>
+          <a:xfrm>
+            <a:off x="1045029" y="0"/>
+            <a:ext cx="0" cy="755780"/>
+          </a:xfrm>
+          <a:prstGeom prst="straightConnector1">
+            <a:avLst/>
+          </a:prstGeom>
+          <a:ln>
+            <a:tailEnd type="triangle"/>
+          </a:ln>
+        </p:spPr>
+        <p:style>
+          <a:lnRef idx="2">
+            <a:schemeClr val="dk1"/>
+          </a:lnRef>
+          <a:fillRef idx="0">
+            <a:schemeClr val="dk1"/>
+          </a:fillRef>
+          <a:effectRef idx="1">
+            <a:schemeClr val="dk1"/>
+          </a:effectRef>
+          <a:fontRef idx="minor">
+            <a:schemeClr val="tx1"/>
+          </a:fontRef>
+        </p:style>
+      </p:cxnSp>
+      <p:sp>
+        <p:nvSpPr>
+          <p:cNvPr id="5" name="TextBox 4"/>
+          <p:cNvSpPr txBox="1"/>
+          <p:nvPr/>
+        </p:nvSpPr>
+        <p:spPr>
+          <a:xfrm>
+            <a:off x="1154925" y="100891"/>
+            <a:ext cx="2484014" cy="553998"/>
+          </a:xfrm>
+          <a:prstGeom prst="rect">
+            <a:avLst/>
+          </a:prstGeom>
+          <a:noFill/>
+        </p:spPr>
+        <p:txBody>
+          <a:bodyPr wrap="square" rtlCol="0">
+            <a:spAutoFit/>
+          </a:bodyPr>
+          <a:lstStyle/>
+          <a:p>
+            <a:r>
+              <a:rPr lang="en-US" sz="3000" dirty="0" smtClean="0"/>
+              <a:t>Flow Direction</a:t>
+            </a:r>
+          </a:p>
+        </p:txBody>
+      </p:sp>
+    </p:spTree>
+    <p:extLst>
+      <p:ext uri="{BB962C8B-B14F-4D97-AF65-F5344CB8AC3E}">
+        <p14:creationId xmlns:p14="http://schemas.microsoft.com/office/powerpoint/2010/main" val="1640649136"/>
+      </p:ext>
+    </p:extLst>
+  </p:cSld>
+  <p:clrMapOvr>
+    <a:masterClrMapping/>
+  </p:clrMapOvr>
 </p:sld>
 </file>
 

</xml_diff>